<commit_message>
Move diagram to the jumbotron
</commit_message>
<xml_diff>
--- a/docs/diagrams/reposenseOverivew.pptx
+++ b/docs/diagrams/reposenseOverivew.pptx
@@ -11,27 +11,27 @@
   <p:notesSz cx="6858000" cy="9144000"/>
   <p:embeddedFontLst>
     <p:embeddedFont>
+      <p:font typeface="Calibri Light" panose="020F0302020204030204" pitchFamily="34" charset="0"/>
+      <p:regular r:id="rId3"/>
+      <p:italic r:id="rId4"/>
+    </p:embeddedFont>
+    <p:embeddedFont>
+      <p:font typeface="Consolas" panose="020B0609020204030204" pitchFamily="49" charset="0"/>
+      <p:regular r:id="rId5"/>
+      <p:bold r:id="rId6"/>
+      <p:italic r:id="rId7"/>
+      <p:boldItalic r:id="rId8"/>
+    </p:embeddedFont>
+    <p:embeddedFont>
       <p:font typeface="Calibri" panose="020F0502020204030204" pitchFamily="34" charset="0"/>
-      <p:regular r:id="rId3"/>
-      <p:bold r:id="rId4"/>
-      <p:italic r:id="rId5"/>
-      <p:boldItalic r:id="rId6"/>
+      <p:regular r:id="rId9"/>
+      <p:bold r:id="rId10"/>
+      <p:italic r:id="rId11"/>
+      <p:boldItalic r:id="rId12"/>
     </p:embeddedFont>
     <p:embeddedFont>
       <p:font typeface="Ink Free" panose="020B0604020202020204" charset="0"/>
-      <p:regular r:id="rId7"/>
-    </p:embeddedFont>
-    <p:embeddedFont>
-      <p:font typeface="Calibri Light" panose="020F0302020204030204" pitchFamily="34" charset="0"/>
-      <p:regular r:id="rId8"/>
-      <p:italic r:id="rId9"/>
-    </p:embeddedFont>
-    <p:embeddedFont>
-      <p:font typeface="Consolas" panose="020B0609020204030204" pitchFamily="49" charset="0"/>
-      <p:regular r:id="rId10"/>
-      <p:bold r:id="rId11"/>
-      <p:italic r:id="rId12"/>
-      <p:boldItalic r:id="rId13"/>
+      <p:regular r:id="rId13"/>
     </p:embeddedFont>
   </p:embeddedFontLst>
   <p:defaultTextStyle>
@@ -393,7 +393,7 @@
           <a:p>
             <a:fld id="{38516F82-6F83-41ED-AEA3-19A2916CC03A}" type="datetimeFigureOut">
               <a:rPr lang="en-US" smtClean="0"/>
-              <a:t>11-Jun-20</a:t>
+              <a:t>13-Jun-20</a:t>
             </a:fld>
             <a:endParaRPr lang="en-US"/>
           </a:p>
@@ -563,7 +563,7 @@
           <a:p>
             <a:fld id="{38516F82-6F83-41ED-AEA3-19A2916CC03A}" type="datetimeFigureOut">
               <a:rPr lang="en-US" smtClean="0"/>
-              <a:t>11-Jun-20</a:t>
+              <a:t>13-Jun-20</a:t>
             </a:fld>
             <a:endParaRPr lang="en-US"/>
           </a:p>
@@ -743,7 +743,7 @@
           <a:p>
             <a:fld id="{38516F82-6F83-41ED-AEA3-19A2916CC03A}" type="datetimeFigureOut">
               <a:rPr lang="en-US" smtClean="0"/>
-              <a:t>11-Jun-20</a:t>
+              <a:t>13-Jun-20</a:t>
             </a:fld>
             <a:endParaRPr lang="en-US"/>
           </a:p>
@@ -913,7 +913,7 @@
           <a:p>
             <a:fld id="{38516F82-6F83-41ED-AEA3-19A2916CC03A}" type="datetimeFigureOut">
               <a:rPr lang="en-US" smtClean="0"/>
-              <a:t>11-Jun-20</a:t>
+              <a:t>13-Jun-20</a:t>
             </a:fld>
             <a:endParaRPr lang="en-US"/>
           </a:p>
@@ -1159,7 +1159,7 @@
           <a:p>
             <a:fld id="{38516F82-6F83-41ED-AEA3-19A2916CC03A}" type="datetimeFigureOut">
               <a:rPr lang="en-US" smtClean="0"/>
-              <a:t>11-Jun-20</a:t>
+              <a:t>13-Jun-20</a:t>
             </a:fld>
             <a:endParaRPr lang="en-US"/>
           </a:p>
@@ -1391,7 +1391,7 @@
           <a:p>
             <a:fld id="{38516F82-6F83-41ED-AEA3-19A2916CC03A}" type="datetimeFigureOut">
               <a:rPr lang="en-US" smtClean="0"/>
-              <a:t>11-Jun-20</a:t>
+              <a:t>13-Jun-20</a:t>
             </a:fld>
             <a:endParaRPr lang="en-US"/>
           </a:p>
@@ -1758,7 +1758,7 @@
           <a:p>
             <a:fld id="{38516F82-6F83-41ED-AEA3-19A2916CC03A}" type="datetimeFigureOut">
               <a:rPr lang="en-US" smtClean="0"/>
-              <a:t>11-Jun-20</a:t>
+              <a:t>13-Jun-20</a:t>
             </a:fld>
             <a:endParaRPr lang="en-US"/>
           </a:p>
@@ -1876,7 +1876,7 @@
           <a:p>
             <a:fld id="{38516F82-6F83-41ED-AEA3-19A2916CC03A}" type="datetimeFigureOut">
               <a:rPr lang="en-US" smtClean="0"/>
-              <a:t>11-Jun-20</a:t>
+              <a:t>13-Jun-20</a:t>
             </a:fld>
             <a:endParaRPr lang="en-US"/>
           </a:p>
@@ -1971,7 +1971,7 @@
           <a:p>
             <a:fld id="{38516F82-6F83-41ED-AEA3-19A2916CC03A}" type="datetimeFigureOut">
               <a:rPr lang="en-US" smtClean="0"/>
-              <a:t>11-Jun-20</a:t>
+              <a:t>13-Jun-20</a:t>
             </a:fld>
             <a:endParaRPr lang="en-US"/>
           </a:p>
@@ -2248,7 +2248,7 @@
           <a:p>
             <a:fld id="{38516F82-6F83-41ED-AEA3-19A2916CC03A}" type="datetimeFigureOut">
               <a:rPr lang="en-US" smtClean="0"/>
-              <a:t>11-Jun-20</a:t>
+              <a:t>13-Jun-20</a:t>
             </a:fld>
             <a:endParaRPr lang="en-US"/>
           </a:p>
@@ -2501,7 +2501,7 @@
           <a:p>
             <a:fld id="{38516F82-6F83-41ED-AEA3-19A2916CC03A}" type="datetimeFigureOut">
               <a:rPr lang="en-US" smtClean="0"/>
-              <a:t>11-Jun-20</a:t>
+              <a:t>13-Jun-20</a:t>
             </a:fld>
             <a:endParaRPr lang="en-US"/>
           </a:p>
@@ -2714,7 +2714,7 @@
           <a:p>
             <a:fld id="{38516F82-6F83-41ED-AEA3-19A2916CC03A}" type="datetimeFigureOut">
               <a:rPr lang="en-US" smtClean="0"/>
-              <a:t>11-Jun-20</a:t>
+              <a:t>13-Jun-20</a:t>
             </a:fld>
             <a:endParaRPr lang="en-US"/>
           </a:p>
@@ -3121,52 +3121,6 @@
       </p:grpSpPr>
       <p:sp>
         <p:nvSpPr>
-          <p:cNvPr id="28" name="Rectangle 27"/>
-          <p:cNvSpPr/>
-          <p:nvPr/>
-        </p:nvSpPr>
-        <p:spPr>
-          <a:xfrm>
-            <a:off x="682053" y="530655"/>
-            <a:ext cx="11215208" cy="5525371"/>
-          </a:xfrm>
-          <a:prstGeom prst="rect">
-            <a:avLst/>
-          </a:prstGeom>
-          <a:solidFill>
-            <a:schemeClr val="bg1"/>
-          </a:solidFill>
-          <a:ln>
-            <a:noFill/>
-          </a:ln>
-        </p:spPr>
-        <p:style>
-          <a:lnRef idx="2">
-            <a:schemeClr val="accent1">
-              <a:shade val="50000"/>
-            </a:schemeClr>
-          </a:lnRef>
-          <a:fillRef idx="1">
-            <a:schemeClr val="accent1"/>
-          </a:fillRef>
-          <a:effectRef idx="0">
-            <a:schemeClr val="accent1"/>
-          </a:effectRef>
-          <a:fontRef idx="minor">
-            <a:schemeClr val="lt1"/>
-          </a:fontRef>
-        </p:style>
-        <p:txBody>
-          <a:bodyPr rtlCol="0" anchor="ctr"/>
-          <a:lstStyle/>
-          <a:p>
-            <a:pPr algn="ctr"/>
-            <a:endParaRPr lang="en-US"/>
-          </a:p>
-        </p:txBody>
-      </p:sp>
-      <p:sp>
-        <p:nvSpPr>
           <p:cNvPr id="55" name="Rounded Rectangle 54"/>
           <p:cNvSpPr/>
           <p:nvPr/>
@@ -3219,7 +3173,7 @@
         </p:nvGrpSpPr>
         <p:grpSpPr>
           <a:xfrm>
-            <a:off x="831955" y="1577945"/>
+            <a:off x="831955" y="1743644"/>
             <a:ext cx="763709" cy="587806"/>
             <a:chOff x="1769165" y="1946672"/>
             <a:chExt cx="1409383" cy="1084763"/>
@@ -3615,7 +3569,7 @@
         </p:nvGrpSpPr>
         <p:grpSpPr>
           <a:xfrm>
-            <a:off x="831955" y="4275961"/>
+            <a:off x="831955" y="3938426"/>
             <a:ext cx="763709" cy="587806"/>
             <a:chOff x="1769165" y="1946672"/>
             <a:chExt cx="1409383" cy="1084763"/>
@@ -3813,7 +3767,7 @@
         </p:nvGrpSpPr>
         <p:grpSpPr>
           <a:xfrm rot="20735185">
-            <a:off x="831955" y="5190858"/>
+            <a:off x="831955" y="4853323"/>
             <a:ext cx="763709" cy="587806"/>
             <a:chOff x="1769165" y="1946672"/>
             <a:chExt cx="1409383" cy="1084763"/>
@@ -4011,13 +3965,15 @@
         </p:nvSpPr>
         <p:spPr>
           <a:xfrm>
-            <a:off x="8382490" y="2333308"/>
+            <a:off x="8382490" y="1879177"/>
             <a:ext cx="2107289" cy="2446909"/>
           </a:xfrm>
           <a:prstGeom prst="rect">
             <a:avLst/>
           </a:prstGeom>
-          <a:noFill/>
+          <a:solidFill>
+            <a:schemeClr val="bg1"/>
+          </a:solidFill>
           <a:ln w="28575">
             <a:solidFill>
               <a:schemeClr val="bg1">
@@ -4059,7 +4015,7 @@
         </p:nvGrpSpPr>
         <p:grpSpPr>
           <a:xfrm rot="20727266" flipH="1">
-            <a:off x="11051097" y="2462634"/>
+            <a:off x="11051097" y="2008503"/>
             <a:ext cx="763709" cy="587806"/>
             <a:chOff x="1769165" y="1946672"/>
             <a:chExt cx="1409383" cy="1084763"/>
@@ -4257,7 +4213,7 @@
         </p:nvGrpSpPr>
         <p:grpSpPr>
           <a:xfrm rot="973795" flipH="1">
-            <a:off x="11069847" y="3240903"/>
+            <a:off x="11069847" y="2786772"/>
             <a:ext cx="763709" cy="587806"/>
             <a:chOff x="1769165" y="1946672"/>
             <a:chExt cx="1409383" cy="1084763"/>
@@ -4479,7 +4435,7 @@
         </p:nvGrpSpPr>
         <p:grpSpPr>
           <a:xfrm>
-            <a:off x="8563197" y="2545537"/>
+            <a:off x="8563197" y="2091406"/>
             <a:ext cx="1759227" cy="602557"/>
             <a:chOff x="8928303" y="5458307"/>
             <a:chExt cx="1759227" cy="602557"/>
@@ -4783,7 +4739,7 @@
         </p:nvSpPr>
         <p:spPr>
           <a:xfrm>
-            <a:off x="8563196" y="3257472"/>
+            <a:off x="8563196" y="2803341"/>
             <a:ext cx="1759227" cy="602557"/>
           </a:xfrm>
           <a:prstGeom prst="rect">
@@ -4832,7 +4788,7 @@
         </p:nvSpPr>
         <p:spPr>
           <a:xfrm>
-            <a:off x="8563195" y="3969407"/>
+            <a:off x="8563195" y="3515276"/>
             <a:ext cx="1759227" cy="602557"/>
           </a:xfrm>
           <a:prstGeom prst="rect">
@@ -4899,8 +4855,8 @@
         </p:nvSpPr>
         <p:spPr>
           <a:xfrm>
-            <a:off x="816001" y="530655"/>
-            <a:ext cx="2969719" cy="646331"/>
+            <a:off x="816001" y="696354"/>
+            <a:ext cx="3068665" cy="646331"/>
           </a:xfrm>
           <a:prstGeom prst="rect">
             <a:avLst/>
@@ -4917,7 +4873,19 @@
               <a:rPr lang="en-US" dirty="0" smtClean="0">
                 <a:latin typeface="Ink Free" panose="03080402000500000000" pitchFamily="66" charset="0"/>
               </a:rPr>
-              <a:t>1. Programmers works saved in </a:t>
+              <a:t>1. </a:t>
+            </a:r>
+            <a:r>
+              <a:rPr lang="en-US" dirty="0" smtClean="0">
+                <a:latin typeface="Ink Free" panose="03080402000500000000" pitchFamily="66" charset="0"/>
+              </a:rPr>
+              <a:t>Programmers’ work </a:t>
+            </a:r>
+            <a:r>
+              <a:rPr lang="en-US" dirty="0" smtClean="0">
+                <a:latin typeface="Ink Free" panose="03080402000500000000" pitchFamily="66" charset="0"/>
+              </a:rPr>
+              <a:t>saved in </a:t>
             </a:r>
             <a:r>
               <a:rPr lang="en-US" b="1" dirty="0" err="1" smtClean="0">
@@ -5009,7 +4977,7 @@
         </p:nvSpPr>
         <p:spPr>
           <a:xfrm>
-            <a:off x="8264803" y="5140395"/>
+            <a:off x="8264803" y="4686264"/>
             <a:ext cx="3249636" cy="646331"/>
           </a:xfrm>
           <a:prstGeom prst="rect">
@@ -5049,7 +5017,7 @@
         </p:nvSpPr>
         <p:spPr>
           <a:xfrm>
-            <a:off x="1006280" y="5753322"/>
+            <a:off x="1006280" y="5415787"/>
             <a:ext cx="198782" cy="198782"/>
           </a:xfrm>
           <a:prstGeom prst="flowChartConnector">
@@ -5093,7 +5061,7 @@
         </p:nvGrpSpPr>
         <p:grpSpPr>
           <a:xfrm>
-            <a:off x="2465784" y="1490431"/>
+            <a:off x="2465784" y="1656130"/>
             <a:ext cx="1170809" cy="912246"/>
             <a:chOff x="2465784" y="1213116"/>
             <a:chExt cx="1170809" cy="912246"/>
@@ -5455,7 +5423,7 @@
         </p:nvGrpSpPr>
         <p:grpSpPr>
           <a:xfrm>
-            <a:off x="2549198" y="4258566"/>
+            <a:off x="2549198" y="3921031"/>
             <a:ext cx="1170809" cy="912246"/>
             <a:chOff x="2465784" y="1213116"/>
             <a:chExt cx="1170809" cy="912246"/>
@@ -5628,8 +5596,8 @@
           </p:spPr>
         </p:pic>
       </p:grpSp>
-      <mc:AlternateContent xmlns:mc="http://schemas.openxmlformats.org/markup-compatibility/2006" xmlns:p14="http://schemas.microsoft.com/office/powerpoint/2010/main">
-        <mc:Choice Requires="p14">
+      <mc:AlternateContent xmlns:mc="http://schemas.openxmlformats.org/markup-compatibility/2006">
+        <mc:Choice xmlns:p14="http://schemas.microsoft.com/office/powerpoint/2010/main" Requires="p14">
           <p:contentPart p14:bwMode="auto" r:id="rId5">
             <p14:nvContentPartPr>
               <p14:cNvPr id="124" name="Ink 123"/>
@@ -5637,12 +5605,12 @@
               <p14:nvPr/>
             </p14:nvContentPartPr>
             <p14:xfrm>
-              <a:off x="10419624" y="5807462"/>
+              <a:off x="10419624" y="5353331"/>
               <a:ext cx="798480" cy="14040"/>
             </p14:xfrm>
           </p:contentPart>
         </mc:Choice>
-        <mc:Fallback xmlns="">
+        <mc:Fallback>
           <p:pic>
             <p:nvPicPr>
               <p:cNvPr id="124" name="Ink 123"/>
@@ -5657,7 +5625,7 @@
             </p:blipFill>
             <p:spPr>
               <a:xfrm>
-                <a:off x="10390464" y="5771822"/>
+                <a:off x="10390464" y="5317691"/>
                 <a:ext cx="863280" cy="83880"/>
               </a:xfrm>
               <a:prstGeom prst="rect">
@@ -5676,7 +5644,7 @@
               <p14:nvPr/>
             </p14:nvContentPartPr>
             <p14:xfrm>
-              <a:off x="1368227" y="1158143"/>
+              <a:off x="1368227" y="1323842"/>
               <a:ext cx="975893" cy="21244"/>
             </p14:xfrm>
           </p:contentPart>
@@ -5696,7 +5664,7 @@
             </p:blipFill>
             <p:spPr>
               <a:xfrm>
-                <a:off x="1337258" y="1121776"/>
+                <a:off x="1337258" y="1287475"/>
                 <a:ext cx="1043233" cy="84256"/>
               </a:xfrm>
               <a:prstGeom prst="rect">
@@ -5767,7 +5735,7 @@
               <p:nvPr/>
             </p:nvPicPr>
             <p:blipFill>
-              <a:blip r:embed="rId6"/>
+              <a:blip r:embed="rId14"/>
               <a:stretch>
                 <a:fillRect/>
               </a:stretch>
@@ -5793,7 +5761,7 @@
           <p:nvPr/>
         </p:nvPicPr>
         <p:blipFill>
-          <a:blip r:embed="rId14" cstate="print">
+          <a:blip r:embed="rId15" cstate="print">
             <a:extLst>
               <a:ext uri="{28A0092B-C50C-407E-A947-70E740481C1C}">
                 <a14:useLocalDpi xmlns:a14="http://schemas.microsoft.com/office/drawing/2010/main" val="0"/>
@@ -5827,7 +5795,7 @@
         </p:nvSpPr>
         <p:spPr>
           <a:xfrm>
-            <a:off x="8619900" y="3338378"/>
+            <a:off x="8619900" y="2884247"/>
             <a:ext cx="1412105" cy="66645"/>
           </a:xfrm>
           <a:prstGeom prst="rect">
@@ -5873,7 +5841,7 @@
         </p:nvSpPr>
         <p:spPr>
           <a:xfrm>
-            <a:off x="8619900" y="3521969"/>
+            <a:off x="8619900" y="3067838"/>
             <a:ext cx="964486" cy="66645"/>
           </a:xfrm>
           <a:prstGeom prst="rect">
@@ -5919,7 +5887,7 @@
         </p:nvSpPr>
         <p:spPr>
           <a:xfrm>
-            <a:off x="8617423" y="3702290"/>
+            <a:off x="8617423" y="3248159"/>
             <a:ext cx="544426" cy="66645"/>
           </a:xfrm>
           <a:prstGeom prst="rect">
@@ -5965,7 +5933,7 @@
         </p:nvSpPr>
         <p:spPr>
           <a:xfrm>
-            <a:off x="9161849" y="3702290"/>
+            <a:off x="9161849" y="3248159"/>
             <a:ext cx="544426" cy="66645"/>
           </a:xfrm>
           <a:prstGeom prst="rect">
@@ -6011,7 +5979,7 @@
         </p:nvSpPr>
         <p:spPr>
           <a:xfrm>
-            <a:off x="9570495" y="3702290"/>
+            <a:off x="9570495" y="3248159"/>
             <a:ext cx="409035" cy="66645"/>
           </a:xfrm>
           <a:prstGeom prst="rect">
@@ -6060,7 +6028,7 @@
         </p:nvSpPr>
         <p:spPr>
           <a:xfrm>
-            <a:off x="8382491" y="2087825"/>
+            <a:off x="8382491" y="1633694"/>
             <a:ext cx="2108162" cy="233455"/>
           </a:xfrm>
           <a:prstGeom prst="round2SameRect">
@@ -6112,7 +6080,7 @@
         </p:nvSpPr>
         <p:spPr>
           <a:xfrm>
-            <a:off x="8440086" y="2140226"/>
+            <a:off x="8440086" y="1686095"/>
             <a:ext cx="1591919" cy="131840"/>
           </a:xfrm>
           <a:prstGeom prst="roundRect">
@@ -6158,7 +6126,7 @@
         </p:nvSpPr>
         <p:spPr>
           <a:xfrm>
-            <a:off x="10096500" y="2160814"/>
+            <a:off x="10096500" y="1706683"/>
             <a:ext cx="100695" cy="100695"/>
           </a:xfrm>
           <a:prstGeom prst="flowChartConnector">
@@ -6204,7 +6172,7 @@
         </p:nvSpPr>
         <p:spPr>
           <a:xfrm>
-            <a:off x="10221727" y="2160814"/>
+            <a:off x="10221727" y="1706683"/>
             <a:ext cx="100695" cy="100695"/>
           </a:xfrm>
           <a:prstGeom prst="flowChartConnector">
@@ -6250,7 +6218,7 @@
         </p:nvSpPr>
         <p:spPr>
           <a:xfrm>
-            <a:off x="10346954" y="2160814"/>
+            <a:off x="10346954" y="1706683"/>
             <a:ext cx="100695" cy="100695"/>
           </a:xfrm>
           <a:prstGeom prst="flowChartConnector">
@@ -6296,7 +6264,7 @@
         </p:nvCxnSpPr>
         <p:spPr>
           <a:xfrm>
-            <a:off x="1683178" y="4609477"/>
+            <a:off x="1683178" y="4271942"/>
             <a:ext cx="595327" cy="58315"/>
           </a:xfrm>
           <a:prstGeom prst="straightConnector1">
@@ -6334,7 +6302,7 @@
         </p:nvCxnSpPr>
         <p:spPr>
           <a:xfrm flipV="1">
-            <a:off x="1683178" y="5107298"/>
+            <a:off x="1683178" y="4769763"/>
             <a:ext cx="595327" cy="206370"/>
           </a:xfrm>
           <a:prstGeom prst="straightConnector1">
@@ -6375,8 +6343,8 @@
         </p:nvCxnSpPr>
         <p:spPr>
           <a:xfrm>
-            <a:off x="3676848" y="2136564"/>
-            <a:ext cx="871724" cy="820700"/>
+            <a:off x="3676848" y="2302263"/>
+            <a:ext cx="871724" cy="655001"/>
           </a:xfrm>
           <a:prstGeom prst="curvedConnector3">
             <a:avLst/>
@@ -6413,15 +6381,13 @@
         </p:nvSpPr>
         <p:spPr>
           <a:xfrm>
-            <a:off x="3567706" y="2081993"/>
+            <a:off x="3567706" y="2247692"/>
             <a:ext cx="109142" cy="109142"/>
           </a:xfrm>
           <a:prstGeom prst="flowChartConnector">
             <a:avLst/>
           </a:prstGeom>
-          <a:solidFill>
-            <a:schemeClr val="bg1"/>
-          </a:solidFill>
+          <a:noFill/>
           <a:ln>
             <a:noFill/>
           </a:ln>
@@ -6465,9 +6431,7 @@
           <a:prstGeom prst="flowChartConnector">
             <a:avLst/>
           </a:prstGeom>
-          <a:solidFill>
-            <a:schemeClr val="bg1"/>
-          </a:solidFill>
+          <a:noFill/>
           <a:ln>
             <a:noFill/>
           </a:ln>
@@ -6509,7 +6473,7 @@
         <p:spPr>
           <a:xfrm flipV="1">
             <a:off x="3735733" y="3490960"/>
-            <a:ext cx="821697" cy="1177701"/>
+            <a:ext cx="821697" cy="840166"/>
           </a:xfrm>
           <a:prstGeom prst="curvedConnector3">
             <a:avLst/>
@@ -6546,15 +6510,13 @@
         </p:nvSpPr>
         <p:spPr>
           <a:xfrm>
-            <a:off x="3626591" y="4614090"/>
+            <a:off x="3626591" y="4276555"/>
             <a:ext cx="109142" cy="109142"/>
           </a:xfrm>
           <a:prstGeom prst="flowChartConnector">
             <a:avLst/>
           </a:prstGeom>
-          <a:solidFill>
-            <a:schemeClr val="bg1"/>
-          </a:solidFill>
+          <a:noFill/>
           <a:ln>
             <a:noFill/>
           </a:ln>
@@ -6598,9 +6560,7 @@
           <a:prstGeom prst="flowChartConnector">
             <a:avLst/>
           </a:prstGeom>
-          <a:solidFill>
-            <a:schemeClr val="bg1"/>
-          </a:solidFill>
+          <a:noFill/>
           <a:ln>
             <a:noFill/>
           </a:ln>
@@ -6685,9 +6645,7 @@
           <a:prstGeom prst="flowChartConnector">
             <a:avLst/>
           </a:prstGeom>
-          <a:solidFill>
-            <a:schemeClr val="bg1"/>
-          </a:solidFill>
+          <a:noFill/>
           <a:ln>
             <a:noFill/>
           </a:ln>
@@ -6731,9 +6689,7 @@
           <a:prstGeom prst="flowChartConnector">
             <a:avLst/>
           </a:prstGeom>
-          <a:solidFill>
-            <a:schemeClr val="bg1"/>
-          </a:solidFill>
+          <a:noFill/>
           <a:ln>
             <a:noFill/>
           </a:ln>
@@ -6771,7 +6727,7 @@
         </p:nvCxnSpPr>
         <p:spPr>
           <a:xfrm>
-            <a:off x="10742044" y="3145983"/>
+            <a:off x="10742044" y="2691852"/>
             <a:ext cx="427343" cy="6340"/>
           </a:xfrm>
           <a:prstGeom prst="curvedConnector3">
@@ -6809,7 +6765,7 @@
         </p:nvCxnSpPr>
         <p:spPr>
           <a:xfrm>
-            <a:off x="10628534" y="3281123"/>
+            <a:off x="10628534" y="2826992"/>
             <a:ext cx="427343" cy="6340"/>
           </a:xfrm>
           <a:prstGeom prst="curvedConnector3">
@@ -6847,7 +6803,7 @@
         </p:nvCxnSpPr>
         <p:spPr>
           <a:xfrm>
-            <a:off x="1632407" y="1893560"/>
+            <a:off x="1632407" y="2059259"/>
             <a:ext cx="608116" cy="626"/>
           </a:xfrm>
           <a:prstGeom prst="straightConnector1">
@@ -6924,7 +6880,7 @@
         <p:spPr>
           <a:xfrm>
             <a:off x="1585014" y="3493681"/>
-            <a:ext cx="681530" cy="717251"/>
+            <a:ext cx="710493" cy="475726"/>
           </a:xfrm>
           <a:prstGeom prst="straightConnector1">
             <a:avLst/>

</xml_diff>